<commit_message>
Updated the presentation. Included design.png with SSL cloud.
</commit_message>
<xml_diff>
--- a/presentation/Third Party Encrypted Storage.pptx
+++ b/presentation/Third Party Encrypted Storage.pptx
@@ -5,17 +5,21 @@
     <p:sldMasterId id="2147483684" r:id="rId1"/>
   </p:sldMasterIdLst>
   <p:notesMasterIdLst>
-    <p:notesMasterId r:id="rId10"/>
+    <p:notesMasterId r:id="rId14"/>
   </p:notesMasterIdLst>
   <p:sldIdLst>
     <p:sldId id="256" r:id="rId2"/>
     <p:sldId id="257" r:id="rId3"/>
-    <p:sldId id="259" r:id="rId4"/>
-    <p:sldId id="258" r:id="rId5"/>
-    <p:sldId id="261" r:id="rId6"/>
-    <p:sldId id="262" r:id="rId7"/>
-    <p:sldId id="260" r:id="rId8"/>
-    <p:sldId id="263" r:id="rId9"/>
+    <p:sldId id="266" r:id="rId4"/>
+    <p:sldId id="259" r:id="rId5"/>
+    <p:sldId id="258" r:id="rId6"/>
+    <p:sldId id="261" r:id="rId7"/>
+    <p:sldId id="267" r:id="rId8"/>
+    <p:sldId id="262" r:id="rId9"/>
+    <p:sldId id="260" r:id="rId10"/>
+    <p:sldId id="263" r:id="rId11"/>
+    <p:sldId id="264" r:id="rId12"/>
+    <p:sldId id="265" r:id="rId13"/>
   </p:sldIdLst>
   <p:sldSz cx="9144000" cy="6858000" type="screen4x3"/>
   <p:notesSz cx="6858000" cy="9144000"/>
@@ -114,6 +118,22 @@
       </a:defRPr>
     </a:lvl9pPr>
   </p:defaultTextStyle>
+  <p:extLst>
+    <p:ext uri="{EFAFB233-063F-42B5-8137-9DF3F51BA10A}">
+      <p15:sldGuideLst xmlns:p15="http://schemas.microsoft.com/office/powerpoint/2012/main">
+        <p15:guide id="1" orient="horz" pos="2160">
+          <p15:clr>
+            <a:srgbClr val="A4A3A4"/>
+          </p15:clr>
+        </p15:guide>
+        <p15:guide id="2" pos="2880">
+          <p15:clr>
+            <a:srgbClr val="A4A3A4"/>
+          </p15:clr>
+        </p15:guide>
+      </p15:sldGuideLst>
+    </p:ext>
+  </p:extLst>
 </p:presentation>
 </file>
 
@@ -199,7 +219,7 @@
           <a:p>
             <a:fld id="{F540DC28-E9C3-4A34-BF35-01475B86E440}" type="datetimeFigureOut">
               <a:rPr lang="en-US" smtClean="0"/>
-              <a:t>12/3/2016</a:t>
+              <a:t>12/4/16</a:t>
             </a:fld>
             <a:endParaRPr lang="en-US"/>
           </a:p>
@@ -592,7 +612,7 @@
           <a:p>
             <a:fld id="{1B53EEDB-D3D0-4F0B-9E07-306F6256FFCB}" type="slidenum">
               <a:rPr lang="en-US" smtClean="0"/>
-              <a:t>5</a:t>
+              <a:t>6</a:t>
             </a:fld>
             <a:endParaRPr lang="en-US"/>
           </a:p>
@@ -854,7 +874,7 @@
           <a:p>
             <a:fld id="{EB422B12-E5CA-478D-9BF4-1E2495F133AB}" type="datetimeFigureOut">
               <a:rPr lang="en-US" smtClean="0"/>
-              <a:t>12/3/2016</a:t>
+              <a:t>12/4/16</a:t>
             </a:fld>
             <a:endParaRPr lang="en-US"/>
           </a:p>
@@ -1077,7 +1097,7 @@
           <a:p>
             <a:fld id="{EB422B12-E5CA-478D-9BF4-1E2495F133AB}" type="datetimeFigureOut">
               <a:rPr lang="en-US" smtClean="0"/>
-              <a:t>12/3/2016</a:t>
+              <a:t>12/4/16</a:t>
             </a:fld>
             <a:endParaRPr lang="en-US"/>
           </a:p>
@@ -1357,7 +1377,7 @@
           <a:p>
             <a:fld id="{EB422B12-E5CA-478D-9BF4-1E2495F133AB}" type="datetimeFigureOut">
               <a:rPr lang="en-US" smtClean="0"/>
-              <a:t>12/3/2016</a:t>
+              <a:t>12/4/16</a:t>
             </a:fld>
             <a:endParaRPr lang="en-US"/>
           </a:p>
@@ -1536,7 +1556,7 @@
           <a:p>
             <a:fld id="{EB422B12-E5CA-478D-9BF4-1E2495F133AB}" type="datetimeFigureOut">
               <a:rPr lang="en-US" smtClean="0"/>
-              <a:t>12/3/2016</a:t>
+              <a:t>12/4/16</a:t>
             </a:fld>
             <a:endParaRPr lang="en-US"/>
           </a:p>
@@ -1894,7 +1914,7 @@
           <a:p>
             <a:fld id="{EB422B12-E5CA-478D-9BF4-1E2495F133AB}" type="datetimeFigureOut">
               <a:rPr lang="en-US" smtClean="0"/>
-              <a:t>12/3/2016</a:t>
+              <a:t>12/4/16</a:t>
             </a:fld>
             <a:endParaRPr lang="en-US"/>
           </a:p>
@@ -2181,7 +2201,7 @@
           <a:p>
             <a:fld id="{EB422B12-E5CA-478D-9BF4-1E2495F133AB}" type="datetimeFigureOut">
               <a:rPr lang="en-US" smtClean="0"/>
-              <a:t>12/3/2016</a:t>
+              <a:t>12/4/16</a:t>
             </a:fld>
             <a:endParaRPr lang="en-US"/>
           </a:p>
@@ -2603,7 +2623,7 @@
           <a:p>
             <a:fld id="{EB422B12-E5CA-478D-9BF4-1E2495F133AB}" type="datetimeFigureOut">
               <a:rPr lang="en-US" smtClean="0"/>
-              <a:t>12/3/2016</a:t>
+              <a:t>12/4/16</a:t>
             </a:fld>
             <a:endParaRPr lang="en-US"/>
           </a:p>
@@ -2718,7 +2738,7 @@
           <a:p>
             <a:fld id="{EB422B12-E5CA-478D-9BF4-1E2495F133AB}" type="datetimeFigureOut">
               <a:rPr lang="en-US" smtClean="0"/>
-              <a:t>12/3/2016</a:t>
+              <a:t>12/4/16</a:t>
             </a:fld>
             <a:endParaRPr lang="en-US"/>
           </a:p>
@@ -2808,7 +2828,7 @@
           <a:p>
             <a:fld id="{EB422B12-E5CA-478D-9BF4-1E2495F133AB}" type="datetimeFigureOut">
               <a:rPr lang="en-US" smtClean="0"/>
-              <a:t>12/3/2016</a:t>
+              <a:t>12/4/16</a:t>
             </a:fld>
             <a:endParaRPr lang="en-US"/>
           </a:p>
@@ -3086,7 +3106,7 @@
           <a:p>
             <a:fld id="{EB422B12-E5CA-478D-9BF4-1E2495F133AB}" type="datetimeFigureOut">
               <a:rPr lang="en-US" smtClean="0"/>
-              <a:t>12/3/2016</a:t>
+              <a:t>12/4/16</a:t>
             </a:fld>
             <a:endParaRPr lang="en-US"/>
           </a:p>
@@ -3452,7 +3472,7 @@
           <a:p>
             <a:fld id="{EB422B12-E5CA-478D-9BF4-1E2495F133AB}" type="datetimeFigureOut">
               <a:rPr lang="en-US" smtClean="0"/>
-              <a:t>12/3/2016</a:t>
+              <a:t>12/4/16</a:t>
             </a:fld>
             <a:endParaRPr lang="en-US"/>
           </a:p>
@@ -3889,7 +3909,7 @@
           <a:p>
             <a:fld id="{EB422B12-E5CA-478D-9BF4-1E2495F133AB}" type="datetimeFigureOut">
               <a:rPr lang="en-US" smtClean="0"/>
-              <a:t>12/3/2016</a:t>
+              <a:t>12/4/16</a:t>
             </a:fld>
             <a:endParaRPr lang="en-US"/>
           </a:p>
@@ -4308,13 +4328,17 @@
         <p:spPr/>
         <p:txBody>
           <a:bodyPr>
-            <a:normAutofit/>
+            <a:normAutofit fontScale="90000"/>
           </a:bodyPr>
           <a:lstStyle/>
           <a:p>
             <a:r>
               <a:rPr lang="en-US" dirty="0" smtClean="0"/>
-              <a:t>Third Party Encrypted Storage</a:t>
+              <a:t>Third Party Encrypted </a:t>
+            </a:r>
+            <a:r>
+              <a:rPr lang="en-US" dirty="0" smtClean="0"/>
+              <a:t>Storage &amp; Password-less Authentication</a:t>
             </a:r>
             <a:endParaRPr lang="en-US" dirty="0"/>
           </a:p>
@@ -4344,6 +4368,313 @@
         </p:txBody>
       </p:sp>
     </p:spTree>
+  </p:cSld>
+  <p:clrMapOvr>
+    <a:masterClrMapping/>
+  </p:clrMapOvr>
+</p:sld>
+</file>
+
+<file path=ppt/slides/slide10.xml><?xml version="1.0" encoding="utf-8"?>
+<p:sld xmlns:a="http://schemas.openxmlformats.org/drawingml/2006/main" xmlns:r="http://schemas.openxmlformats.org/officeDocument/2006/relationships" xmlns:p="http://schemas.openxmlformats.org/presentationml/2006/main">
+  <p:cSld>
+    <p:spTree>
+      <p:nvGrpSpPr>
+        <p:cNvPr id="1" name=""/>
+        <p:cNvGrpSpPr/>
+        <p:nvPr/>
+      </p:nvGrpSpPr>
+      <p:grpSpPr>
+        <a:xfrm>
+          <a:off x="0" y="0"/>
+          <a:ext cx="0" cy="0"/>
+          <a:chOff x="0" y="0"/>
+          <a:chExt cx="0" cy="0"/>
+        </a:xfrm>
+      </p:grpSpPr>
+      <p:sp>
+        <p:nvSpPr>
+          <p:cNvPr id="2" name="Title 1"/>
+          <p:cNvSpPr>
+            <a:spLocks noGrp="1"/>
+          </p:cNvSpPr>
+          <p:nvPr>
+            <p:ph type="title"/>
+          </p:nvPr>
+        </p:nvSpPr>
+        <p:spPr/>
+        <p:txBody>
+          <a:bodyPr/>
+          <a:lstStyle/>
+          <a:p>
+            <a:r>
+              <a:rPr lang="en-US" dirty="0" smtClean="0"/>
+              <a:t>Conclusion - Benefits</a:t>
+            </a:r>
+            <a:endParaRPr lang="en-US" dirty="0"/>
+          </a:p>
+        </p:txBody>
+      </p:sp>
+      <p:sp>
+        <p:nvSpPr>
+          <p:cNvPr id="3" name="Content Placeholder 2"/>
+          <p:cNvSpPr>
+            <a:spLocks noGrp="1"/>
+          </p:cNvSpPr>
+          <p:nvPr>
+            <p:ph idx="1"/>
+          </p:nvPr>
+        </p:nvSpPr>
+        <p:spPr/>
+        <p:txBody>
+          <a:bodyPr>
+            <a:normAutofit lnSpcReduction="10000"/>
+          </a:bodyPr>
+          <a:lstStyle/>
+          <a:p>
+            <a:r>
+              <a:rPr lang="en-US" dirty="0" smtClean="0"/>
+              <a:t>The user </a:t>
+            </a:r>
+            <a:r>
+              <a:rPr lang="en-US" dirty="0" smtClean="0"/>
+              <a:t>keeps all his information </a:t>
+            </a:r>
+            <a:r>
+              <a:rPr lang="en-US" dirty="0" smtClean="0"/>
+              <a:t>(email, CC info, phone #, </a:t>
+            </a:r>
+            <a:r>
+              <a:rPr lang="en-US" dirty="0" err="1" smtClean="0"/>
+              <a:t>etc</a:t>
+            </a:r>
+            <a:r>
+              <a:rPr lang="mr-IN" dirty="0" smtClean="0"/>
+              <a:t>…</a:t>
+            </a:r>
+            <a:r>
+              <a:rPr lang="en-US" dirty="0" smtClean="0"/>
+              <a:t>) in one place.</a:t>
+            </a:r>
+          </a:p>
+          <a:p>
+            <a:endParaRPr lang="en-US" dirty="0" smtClean="0"/>
+          </a:p>
+          <a:p>
+            <a:r>
+              <a:rPr lang="en-US" dirty="0" smtClean="0"/>
+              <a:t>Even if the authentication server is compromised, all of the data is encrypted, and the key doesn’t exist on that system</a:t>
+            </a:r>
+            <a:r>
+              <a:rPr lang="en-US" dirty="0" smtClean="0"/>
+              <a:t>.</a:t>
+            </a:r>
+          </a:p>
+          <a:p>
+            <a:endParaRPr lang="en-US" dirty="0" smtClean="0"/>
+          </a:p>
+          <a:p>
+            <a:r>
+              <a:rPr lang="en-US" dirty="0" smtClean="0"/>
+              <a:t>The user doesn’t have to remember a password. The user can’t choose a weak password.</a:t>
+            </a:r>
+            <a:endParaRPr lang="en-US" dirty="0"/>
+          </a:p>
+        </p:txBody>
+      </p:sp>
+    </p:spTree>
+  </p:cSld>
+  <p:clrMapOvr>
+    <a:masterClrMapping/>
+  </p:clrMapOvr>
+</p:sld>
+</file>
+
+<file path=ppt/slides/slide11.xml><?xml version="1.0" encoding="utf-8"?>
+<p:sld xmlns:a="http://schemas.openxmlformats.org/drawingml/2006/main" xmlns:r="http://schemas.openxmlformats.org/officeDocument/2006/relationships" xmlns:p="http://schemas.openxmlformats.org/presentationml/2006/main">
+  <p:cSld>
+    <p:spTree>
+      <p:nvGrpSpPr>
+        <p:cNvPr id="1" name=""/>
+        <p:cNvGrpSpPr/>
+        <p:nvPr/>
+      </p:nvGrpSpPr>
+      <p:grpSpPr>
+        <a:xfrm>
+          <a:off x="0" y="0"/>
+          <a:ext cx="0" cy="0"/>
+          <a:chOff x="0" y="0"/>
+          <a:chExt cx="0" cy="0"/>
+        </a:xfrm>
+      </p:grpSpPr>
+      <p:sp>
+        <p:nvSpPr>
+          <p:cNvPr id="2" name="Title 1"/>
+          <p:cNvSpPr>
+            <a:spLocks noGrp="1"/>
+          </p:cNvSpPr>
+          <p:nvPr>
+            <p:ph type="title"/>
+          </p:nvPr>
+        </p:nvSpPr>
+        <p:spPr/>
+        <p:txBody>
+          <a:bodyPr/>
+          <a:lstStyle/>
+          <a:p>
+            <a:r>
+              <a:rPr lang="en-US" dirty="0" smtClean="0"/>
+              <a:t>Conclusion - </a:t>
+            </a:r>
+            <a:r>
+              <a:rPr lang="en-US" dirty="0" smtClean="0"/>
+              <a:t>Problems</a:t>
+            </a:r>
+            <a:endParaRPr lang="en-US" dirty="0"/>
+          </a:p>
+        </p:txBody>
+      </p:sp>
+      <p:sp>
+        <p:nvSpPr>
+          <p:cNvPr id="3" name="Content Placeholder 2"/>
+          <p:cNvSpPr>
+            <a:spLocks noGrp="1"/>
+          </p:cNvSpPr>
+          <p:nvPr>
+            <p:ph idx="1"/>
+          </p:nvPr>
+        </p:nvSpPr>
+        <p:spPr/>
+        <p:txBody>
+          <a:bodyPr/>
+          <a:lstStyle/>
+          <a:p>
+            <a:r>
+              <a:rPr lang="en-US" dirty="0" smtClean="0"/>
+              <a:t>Replacing “forgot my password” problem with “lost my device” problem.</a:t>
+            </a:r>
+          </a:p>
+          <a:p>
+            <a:pPr lvl="1"/>
+            <a:r>
+              <a:rPr lang="en-US" dirty="0" smtClean="0"/>
+              <a:t>User can have multiple trusted devices (each with a copy of a key)</a:t>
+            </a:r>
+          </a:p>
+          <a:p>
+            <a:pPr lvl="1"/>
+            <a:r>
+              <a:rPr lang="en-US" dirty="0" smtClean="0"/>
+              <a:t>Give users a “recovery key”</a:t>
+            </a:r>
+          </a:p>
+          <a:p>
+            <a:r>
+              <a:rPr lang="en-US" dirty="0" smtClean="0"/>
+              <a:t>The key exists on the server for a brief period of time.</a:t>
+            </a:r>
+          </a:p>
+          <a:p>
+            <a:pPr lvl="1"/>
+            <a:r>
+              <a:rPr lang="en-US" dirty="0" smtClean="0"/>
+              <a:t>User’s must trust the server organization with their data.</a:t>
+            </a:r>
+            <a:endParaRPr lang="en-US" dirty="0"/>
+          </a:p>
+        </p:txBody>
+      </p:sp>
+    </p:spTree>
+    <p:extLst>
+      <p:ext uri="{BB962C8B-B14F-4D97-AF65-F5344CB8AC3E}">
+        <p14:creationId xmlns:p14="http://schemas.microsoft.com/office/powerpoint/2010/main" val="902951724"/>
+      </p:ext>
+    </p:extLst>
+  </p:cSld>
+  <p:clrMapOvr>
+    <a:masterClrMapping/>
+  </p:clrMapOvr>
+</p:sld>
+</file>
+
+<file path=ppt/slides/slide12.xml><?xml version="1.0" encoding="utf-8"?>
+<p:sld xmlns:a="http://schemas.openxmlformats.org/drawingml/2006/main" xmlns:r="http://schemas.openxmlformats.org/officeDocument/2006/relationships" xmlns:p="http://schemas.openxmlformats.org/presentationml/2006/main">
+  <p:cSld>
+    <p:spTree>
+      <p:nvGrpSpPr>
+        <p:cNvPr id="1" name=""/>
+        <p:cNvGrpSpPr/>
+        <p:nvPr/>
+      </p:nvGrpSpPr>
+      <p:grpSpPr>
+        <a:xfrm>
+          <a:off x="0" y="0"/>
+          <a:ext cx="0" cy="0"/>
+          <a:chOff x="0" y="0"/>
+          <a:chExt cx="0" cy="0"/>
+        </a:xfrm>
+      </p:grpSpPr>
+      <p:sp>
+        <p:nvSpPr>
+          <p:cNvPr id="2" name="Title 1"/>
+          <p:cNvSpPr>
+            <a:spLocks noGrp="1"/>
+          </p:cNvSpPr>
+          <p:nvPr>
+            <p:ph type="title"/>
+          </p:nvPr>
+        </p:nvSpPr>
+        <p:spPr/>
+        <p:txBody>
+          <a:bodyPr>
+            <a:normAutofit fontScale="90000"/>
+          </a:bodyPr>
+          <a:lstStyle/>
+          <a:p>
+            <a:r>
+              <a:rPr lang="en-US" dirty="0" smtClean="0"/>
+              <a:t>Questions? Comments? Concerns?</a:t>
+            </a:r>
+            <a:endParaRPr lang="en-US" dirty="0"/>
+          </a:p>
+        </p:txBody>
+      </p:sp>
+      <p:pic>
+        <p:nvPicPr>
+          <p:cNvPr id="5" name="Picture 4"/>
+          <p:cNvPicPr>
+            <a:picLocks noChangeAspect="1"/>
+          </p:cNvPicPr>
+          <p:nvPr/>
+        </p:nvPicPr>
+        <p:blipFill>
+          <a:blip r:embed="rId2">
+            <a:extLst>
+              <a:ext uri="{28A0092B-C50C-407E-A947-70E740481C1C}">
+                <a14:useLocalDpi xmlns:a14="http://schemas.microsoft.com/office/drawing/2010/main" val="0"/>
+              </a:ext>
+            </a:extLst>
+          </a:blip>
+          <a:stretch>
+            <a:fillRect/>
+          </a:stretch>
+        </p:blipFill>
+        <p:spPr>
+          <a:xfrm>
+            <a:off x="0" y="1735466"/>
+            <a:ext cx="9144000" cy="5117315"/>
+          </a:xfrm>
+          <a:prstGeom prst="rect">
+            <a:avLst/>
+          </a:prstGeom>
+        </p:spPr>
+      </p:pic>
+    </p:spTree>
+    <p:extLst>
+      <p:ext uri="{BB962C8B-B14F-4D97-AF65-F5344CB8AC3E}">
+        <p14:creationId xmlns:p14="http://schemas.microsoft.com/office/powerpoint/2010/main" val="593285847"/>
+      </p:ext>
+    </p:extLst>
   </p:cSld>
   <p:clrMapOvr>
     <a:masterClrMapping/>
@@ -4403,18 +4734,53 @@
         </p:nvSpPr>
         <p:spPr/>
         <p:txBody>
-          <a:bodyPr/>
+          <a:bodyPr>
+            <a:normAutofit lnSpcReduction="10000"/>
+          </a:bodyPr>
           <a:lstStyle/>
           <a:p>
             <a:r>
               <a:rPr lang="en-US" dirty="0" smtClean="0"/>
-              <a:t>Remembering passwords is hard</a:t>
-            </a:r>
-          </a:p>
-          <a:p>
-            <a:r>
-              <a:rPr lang="en-US" dirty="0" smtClean="0"/>
-              <a:t>Putting trust in another party is also less than desirable</a:t>
+              <a:t>Remembering passwords is </a:t>
+            </a:r>
+            <a:r>
+              <a:rPr lang="en-US" dirty="0" smtClean="0"/>
+              <a:t>hard</a:t>
+            </a:r>
+          </a:p>
+          <a:p>
+            <a:endParaRPr lang="en-US" dirty="0" smtClean="0"/>
+          </a:p>
+          <a:p>
+            <a:r>
+              <a:rPr lang="en-US" dirty="0" smtClean="0"/>
+              <a:t>Keeping every website/app you have an account with up to date is hard</a:t>
+            </a:r>
+          </a:p>
+          <a:p>
+            <a:endParaRPr lang="en-US" dirty="0" smtClean="0"/>
+          </a:p>
+          <a:p>
+            <a:r>
+              <a:rPr lang="en-US" dirty="0" smtClean="0"/>
+              <a:t>Every website/app that you use wants you to create an account with them</a:t>
+            </a:r>
+          </a:p>
+          <a:p>
+            <a:endParaRPr lang="en-US" dirty="0" smtClean="0"/>
+          </a:p>
+          <a:p>
+            <a:r>
+              <a:rPr lang="en-US" dirty="0" smtClean="0"/>
+              <a:t>Putting trust in another </a:t>
+            </a:r>
+            <a:r>
+              <a:rPr lang="en-US" dirty="0" smtClean="0"/>
+              <a:t>party (ex. Facebook) </a:t>
+            </a:r>
+            <a:r>
+              <a:rPr lang="en-US" dirty="0" smtClean="0"/>
+              <a:t>is also less than desirable</a:t>
             </a:r>
           </a:p>
           <a:p>
@@ -4464,93 +4830,77 @@
           <a:p>
             <a:r>
               <a:rPr lang="en-US" dirty="0" smtClean="0"/>
-              <a:t>Solution</a:t>
+              <a:t>Passwords Are Hard</a:t>
             </a:r>
             <a:endParaRPr lang="en-US" dirty="0"/>
           </a:p>
         </p:txBody>
       </p:sp>
-      <p:sp>
-        <p:nvSpPr>
-          <p:cNvPr id="3" name="Content Placeholder 2"/>
-          <p:cNvSpPr>
-            <a:spLocks noGrp="1"/>
-          </p:cNvSpPr>
-          <p:nvPr>
-            <p:ph idx="1"/>
-          </p:nvPr>
-        </p:nvSpPr>
-        <p:spPr/>
-        <p:txBody>
-          <a:bodyPr>
-            <a:normAutofit fontScale="92500" lnSpcReduction="10000"/>
+      <p:pic>
+        <p:nvPicPr>
+          <p:cNvPr id="5" name="Picture 4"/>
+          <p:cNvPicPr>
+            <a:picLocks noChangeAspect="1"/>
+          </p:cNvPicPr>
+          <p:nvPr/>
+        </p:nvPicPr>
+        <p:blipFill>
+          <a:blip r:embed="rId2">
+            <a:extLst>
+              <a:ext uri="{28A0092B-C50C-407E-A947-70E740481C1C}">
+                <a14:useLocalDpi xmlns:a14="http://schemas.microsoft.com/office/drawing/2010/main" val="0"/>
+              </a:ext>
+            </a:extLst>
+          </a:blip>
+          <a:stretch>
+            <a:fillRect/>
+          </a:stretch>
+        </p:blipFill>
+        <p:spPr>
+          <a:xfrm>
+            <a:off x="2882900" y="2291936"/>
+            <a:ext cx="3378200" cy="3175000"/>
+          </a:xfrm>
+          <a:prstGeom prst="rect">
+            <a:avLst/>
+          </a:prstGeom>
+        </p:spPr>
+      </p:pic>
+      <p:sp>
+        <p:nvSpPr>
+          <p:cNvPr id="6" name="TextBox 5"/>
+          <p:cNvSpPr txBox="1"/>
+          <p:nvPr/>
+        </p:nvSpPr>
+        <p:spPr>
+          <a:xfrm>
+            <a:off x="457200" y="5791200"/>
+            <a:ext cx="8229600" cy="646331"/>
+          </a:xfrm>
+          <a:prstGeom prst="rect">
+            <a:avLst/>
+          </a:prstGeom>
+          <a:noFill/>
+        </p:spPr>
+        <p:txBody>
+          <a:bodyPr wrap="square" rtlCol="0">
+            <a:spAutoFit/>
           </a:bodyPr>
           <a:lstStyle/>
           <a:p>
             <a:r>
               <a:rPr lang="en-US" dirty="0" smtClean="0"/>
-              <a:t>Put our data encrypted in one place</a:t>
-            </a:r>
-          </a:p>
-          <a:p>
-            <a:r>
-              <a:rPr lang="en-US" dirty="0" smtClean="0"/>
-              <a:t>Generate our key from another location</a:t>
-            </a:r>
-          </a:p>
-          <a:p>
-            <a:r>
-              <a:rPr lang="en-US" dirty="0" smtClean="0"/>
-              <a:t>Decrypt the data in the database</a:t>
-            </a:r>
-          </a:p>
-          <a:p>
-            <a:r>
-              <a:rPr lang="en-US" dirty="0" smtClean="0"/>
-              <a:t>Immediately forget the key </a:t>
-            </a:r>
-          </a:p>
-          <a:p>
-            <a:endParaRPr lang="en-US" dirty="0" smtClean="0"/>
-          </a:p>
-          <a:p>
-            <a:r>
-              <a:rPr lang="en-US" dirty="0" smtClean="0"/>
-              <a:t>Four parties:</a:t>
-            </a:r>
-          </a:p>
-          <a:p>
-            <a:pPr lvl="1"/>
-            <a:r>
-              <a:rPr lang="en-US" dirty="0" smtClean="0"/>
-              <a:t>User</a:t>
-            </a:r>
-          </a:p>
-          <a:p>
-            <a:pPr lvl="1"/>
-            <a:r>
-              <a:rPr lang="en-US" dirty="0" smtClean="0"/>
-              <a:t>Database Server</a:t>
-            </a:r>
-          </a:p>
-          <a:p>
-            <a:pPr lvl="1"/>
-            <a:r>
-              <a:rPr lang="en-US" dirty="0" smtClean="0"/>
-              <a:t>Portal Server</a:t>
-            </a:r>
-          </a:p>
-          <a:p>
-            <a:pPr lvl="1"/>
-            <a:r>
-              <a:rPr lang="en-US" dirty="0" smtClean="0"/>
-              <a:t>User application</a:t>
-            </a:r>
-            <a:endParaRPr lang="en-US" dirty="0"/>
+              <a:t>“Starting today, all passwords must contain letters, numbers, doodles, sign language and squirrel noises”</a:t>
+            </a:r>
           </a:p>
         </p:txBody>
       </p:sp>
     </p:spTree>
+    <p:extLst>
+      <p:ext uri="{BB962C8B-B14F-4D97-AF65-F5344CB8AC3E}">
+        <p14:creationId xmlns:p14="http://schemas.microsoft.com/office/powerpoint/2010/main" val="1075524660"/>
+      </p:ext>
+    </p:extLst>
   </p:cSld>
   <p:clrMapOvr>
     <a:masterClrMapping/>
@@ -4592,35 +4942,98 @@
           <a:p>
             <a:r>
               <a:rPr lang="en-US" dirty="0" smtClean="0"/>
-              <a:t>Design</a:t>
+              <a:t>Solution</a:t>
             </a:r>
             <a:endParaRPr lang="en-US" dirty="0"/>
           </a:p>
         </p:txBody>
       </p:sp>
-      <p:pic>
-        <p:nvPicPr>
-          <p:cNvPr id="4" name="Content Placeholder 3" descr="Design.png"/>
-          <p:cNvPicPr>
-            <a:picLocks noGrp="1" noChangeAspect="1"/>
-          </p:cNvPicPr>
+      <p:sp>
+        <p:nvSpPr>
+          <p:cNvPr id="3" name="Content Placeholder 2"/>
+          <p:cNvSpPr>
+            <a:spLocks noGrp="1"/>
+          </p:cNvSpPr>
           <p:nvPr>
             <p:ph idx="1"/>
           </p:nvPr>
-        </p:nvPicPr>
-        <p:blipFill>
-          <a:blip r:embed="rId2" cstate="print"/>
-          <a:stretch>
-            <a:fillRect/>
-          </a:stretch>
-        </p:blipFill>
-        <p:spPr>
-          <a:xfrm>
-            <a:off x="1151504" y="1774825"/>
-            <a:ext cx="6840991" cy="4625975"/>
-          </a:xfrm>
-        </p:spPr>
-      </p:pic>
+        </p:nvSpPr>
+        <p:spPr/>
+        <p:txBody>
+          <a:bodyPr>
+            <a:normAutofit fontScale="92500" lnSpcReduction="10000"/>
+          </a:bodyPr>
+          <a:lstStyle/>
+          <a:p>
+            <a:r>
+              <a:rPr lang="en-US" dirty="0" smtClean="0"/>
+              <a:t>Put our data encrypted in one place</a:t>
+            </a:r>
+          </a:p>
+          <a:p>
+            <a:r>
+              <a:rPr lang="en-US" dirty="0" smtClean="0"/>
+              <a:t>Store decryption key in trusted locations</a:t>
+            </a:r>
+            <a:endParaRPr lang="en-US" dirty="0" smtClean="0"/>
+          </a:p>
+          <a:p>
+            <a:r>
+              <a:rPr lang="en-US" dirty="0" smtClean="0"/>
+              <a:t>Decrypt the data in the database</a:t>
+            </a:r>
+          </a:p>
+          <a:p>
+            <a:r>
+              <a:rPr lang="en-US" dirty="0" smtClean="0"/>
+              <a:t>Immediately forget the key </a:t>
+            </a:r>
+            <a:r>
+              <a:rPr lang="en-US" dirty="0" smtClean="0"/>
+              <a:t>afterwards</a:t>
+            </a:r>
+            <a:endParaRPr lang="en-US" dirty="0" smtClean="0"/>
+          </a:p>
+          <a:p>
+            <a:endParaRPr lang="en-US" dirty="0" smtClean="0"/>
+          </a:p>
+          <a:p>
+            <a:r>
+              <a:rPr lang="en-US" dirty="0" smtClean="0"/>
+              <a:t>Four parties:</a:t>
+            </a:r>
+          </a:p>
+          <a:p>
+            <a:pPr lvl="1"/>
+            <a:r>
+              <a:rPr lang="en-US" dirty="0" smtClean="0"/>
+              <a:t>User</a:t>
+            </a:r>
+          </a:p>
+          <a:p>
+            <a:pPr lvl="1"/>
+            <a:r>
+              <a:rPr lang="en-US" dirty="0" smtClean="0"/>
+              <a:t>Database Server</a:t>
+            </a:r>
+          </a:p>
+          <a:p>
+            <a:pPr lvl="1"/>
+            <a:r>
+              <a:rPr lang="en-US" dirty="0" smtClean="0"/>
+              <a:t>Portal Server</a:t>
+            </a:r>
+          </a:p>
+          <a:p>
+            <a:pPr lvl="1"/>
+            <a:r>
+              <a:rPr lang="en-US" dirty="0" smtClean="0"/>
+              <a:t>User application</a:t>
+            </a:r>
+            <a:endParaRPr lang="en-US" dirty="0"/>
+          </a:p>
+        </p:txBody>
+      </p:sp>
     </p:spTree>
   </p:cSld>
   <p:clrMapOvr>
@@ -4663,72 +5076,42 @@
           <a:p>
             <a:r>
               <a:rPr lang="en-US" dirty="0" smtClean="0"/>
-              <a:t>Solution – Example Scenario</a:t>
+              <a:t>Design</a:t>
             </a:r>
             <a:endParaRPr lang="en-US" dirty="0"/>
           </a:p>
         </p:txBody>
       </p:sp>
-      <p:sp>
-        <p:nvSpPr>
-          <p:cNvPr id="3" name="Content Placeholder 2"/>
-          <p:cNvSpPr>
-            <a:spLocks noGrp="1"/>
-          </p:cNvSpPr>
-          <p:nvPr>
-            <p:ph idx="1"/>
-          </p:nvPr>
-        </p:nvSpPr>
-        <p:spPr/>
-        <p:txBody>
-          <a:bodyPr>
-            <a:normAutofit fontScale="77500" lnSpcReduction="20000"/>
-          </a:bodyPr>
-          <a:lstStyle/>
-          <a:p>
-            <a:r>
-              <a:rPr lang="en-US" dirty="0" smtClean="0"/>
-              <a:t>User Bob wishes to send his credit card information to a site that uses our system</a:t>
-            </a:r>
-          </a:p>
-          <a:p>
-            <a:endParaRPr lang="en-US" dirty="0" smtClean="0"/>
-          </a:p>
-          <a:p>
-            <a:r>
-              <a:rPr lang="en-US" dirty="0" smtClean="0"/>
-              <a:t>That site sends a request to the authentication server (with the requested data)</a:t>
-            </a:r>
-          </a:p>
-          <a:p>
-            <a:endParaRPr lang="en-US" dirty="0" smtClean="0"/>
-          </a:p>
-          <a:p>
-            <a:r>
-              <a:rPr lang="en-US" dirty="0" smtClean="0"/>
-              <a:t>The third-party application opens up a connection to the portal site, the portal asks for the Bob’s permission</a:t>
-            </a:r>
-          </a:p>
-          <a:p>
-            <a:endParaRPr lang="en-US" dirty="0" smtClean="0"/>
-          </a:p>
-          <a:p>
-            <a:r>
-              <a:rPr lang="en-US" dirty="0" smtClean="0"/>
-              <a:t>Bob accepts (or denies) the request, the key is generated via password input (or from a cache)</a:t>
-            </a:r>
-          </a:p>
-          <a:p>
-            <a:endParaRPr lang="en-US" dirty="0" smtClean="0"/>
-          </a:p>
-          <a:p>
-            <a:r>
-              <a:rPr lang="en-US" dirty="0" smtClean="0"/>
-              <a:t>Key is sent to the server, the data is decrypted, sent to the third-party application, and then the key is forgotten</a:t>
-            </a:r>
-          </a:p>
-        </p:txBody>
-      </p:sp>
+      <p:pic>
+        <p:nvPicPr>
+          <p:cNvPr id="5" name="Picture 4"/>
+          <p:cNvPicPr>
+            <a:picLocks noChangeAspect="1"/>
+          </p:cNvPicPr>
+          <p:nvPr/>
+        </p:nvPicPr>
+        <p:blipFill>
+          <a:blip r:embed="rId2">
+            <a:extLst>
+              <a:ext uri="{28A0092B-C50C-407E-A947-70E740481C1C}">
+                <a14:useLocalDpi xmlns:a14="http://schemas.microsoft.com/office/drawing/2010/main" val="0"/>
+              </a:ext>
+            </a:extLst>
+          </a:blip>
+          <a:stretch>
+            <a:fillRect/>
+          </a:stretch>
+        </p:blipFill>
+        <p:spPr>
+          <a:xfrm>
+            <a:off x="498953" y="1392518"/>
+            <a:ext cx="8416447" cy="6061098"/>
+          </a:xfrm>
+          <a:prstGeom prst="rect">
+            <a:avLst/>
+          </a:prstGeom>
+        </p:spPr>
+      </p:pic>
     </p:spTree>
   </p:cSld>
   <p:clrMapOvr>
@@ -4756,7 +5139,7 @@
       </p:grpSpPr>
       <p:sp>
         <p:nvSpPr>
-          <p:cNvPr id="5" name="Title 4"/>
+          <p:cNvPr id="2" name="Title 1"/>
           <p:cNvSpPr>
             <a:spLocks noGrp="1"/>
           </p:cNvSpPr>
@@ -4771,55 +5154,124 @@
           <a:p>
             <a:r>
               <a:rPr lang="en-US" dirty="0" smtClean="0"/>
-              <a:t>Solution – Message Diagram</a:t>
+              <a:t>Solution – Example Scenario</a:t>
             </a:r>
             <a:endParaRPr lang="en-US" dirty="0"/>
           </a:p>
         </p:txBody>
       </p:sp>
-      <p:pic>
-        <p:nvPicPr>
-          <p:cNvPr id="4" name="Content Placeholder 3" descr="message diagram.png"/>
-          <p:cNvPicPr>
-            <a:picLocks noGrp="1" noChangeAspect="1"/>
-          </p:cNvPicPr>
-          <p:nvPr>
-            <p:ph sz="half" idx="1"/>
-          </p:nvPr>
-        </p:nvPicPr>
-        <p:blipFill>
-          <a:blip r:embed="rId2" cstate="print"/>
-          <a:stretch>
-            <a:fillRect/>
-          </a:stretch>
-        </p:blipFill>
+      <p:sp>
+        <p:nvSpPr>
+          <p:cNvPr id="3" name="Content Placeholder 2"/>
+          <p:cNvSpPr>
+            <a:spLocks noGrp="1"/>
+          </p:cNvSpPr>
+          <p:nvPr>
+            <p:ph idx="1"/>
+          </p:nvPr>
+        </p:nvSpPr>
         <p:spPr>
           <a:xfrm>
-            <a:off x="457200" y="2756222"/>
-            <a:ext cx="4038600" cy="2658418"/>
+            <a:off x="457200" y="1775191"/>
+            <a:ext cx="8229600" cy="4930409"/>
           </a:xfrm>
         </p:spPr>
-      </p:pic>
-      <p:sp>
-        <p:nvSpPr>
-          <p:cNvPr id="6" name="Content Placeholder 5"/>
-          <p:cNvSpPr>
-            <a:spLocks noGrp="1"/>
-          </p:cNvSpPr>
-          <p:nvPr>
-            <p:ph sz="half" idx="2"/>
-          </p:nvPr>
-        </p:nvSpPr>
-        <p:spPr/>
-        <p:txBody>
-          <a:bodyPr/>
+        <p:txBody>
+          <a:bodyPr>
+            <a:normAutofit fontScale="77500" lnSpcReduction="20000"/>
+          </a:bodyPr>
           <a:lstStyle/>
           <a:p>
-            <a:pPr>
-              <a:buFont typeface="Arial" pitchFamily="34" charset="0"/>
-              <a:buChar char="•"/>
-            </a:pPr>
-            <a:endParaRPr lang="en-US" dirty="0"/>
+            <a:r>
+              <a:rPr lang="en-US" dirty="0" smtClean="0"/>
+              <a:t>User Bob wishes to </a:t>
+            </a:r>
+            <a:r>
+              <a:rPr lang="en-US" dirty="0" smtClean="0"/>
+              <a:t>login to an E-Commerce website that uses our system</a:t>
+            </a:r>
+            <a:endParaRPr lang="en-US" dirty="0" smtClean="0"/>
+          </a:p>
+          <a:p>
+            <a:endParaRPr lang="en-US" dirty="0" smtClean="0"/>
+          </a:p>
+          <a:p>
+            <a:r>
+              <a:rPr lang="en-US" dirty="0" smtClean="0"/>
+              <a:t>That site sends a request to the authentication </a:t>
+            </a:r>
+            <a:r>
+              <a:rPr lang="en-US" dirty="0" smtClean="0"/>
+              <a:t>server</a:t>
+            </a:r>
+          </a:p>
+          <a:p>
+            <a:endParaRPr lang="en-US" dirty="0" smtClean="0"/>
+          </a:p>
+          <a:p>
+            <a:r>
+              <a:rPr lang="en-US" dirty="0" smtClean="0"/>
+              <a:t>The E-Commerce website </a:t>
+            </a:r>
+            <a:r>
+              <a:rPr lang="en-US" dirty="0"/>
+              <a:t>opens </a:t>
+            </a:r>
+            <a:r>
+              <a:rPr lang="en-US" dirty="0" smtClean="0"/>
+              <a:t>up a connection to the </a:t>
+            </a:r>
+            <a:r>
+              <a:rPr lang="en-US" dirty="0" smtClean="0"/>
+              <a:t>portal (Bob’s trusted device), </a:t>
+            </a:r>
+            <a:r>
+              <a:rPr lang="en-US" dirty="0" smtClean="0"/>
+              <a:t>the portal asks for </a:t>
+            </a:r>
+            <a:r>
+              <a:rPr lang="en-US" dirty="0" smtClean="0"/>
+              <a:t>Bob’s </a:t>
+            </a:r>
+            <a:r>
+              <a:rPr lang="en-US" dirty="0" smtClean="0"/>
+              <a:t>permission</a:t>
+            </a:r>
+          </a:p>
+          <a:p>
+            <a:endParaRPr lang="en-US" dirty="0" smtClean="0"/>
+          </a:p>
+          <a:p>
+            <a:r>
+              <a:rPr lang="en-US" dirty="0" smtClean="0"/>
+              <a:t>Bob accepts (or denies) the request, the key </a:t>
+            </a:r>
+            <a:r>
+              <a:rPr lang="en-US" dirty="0" smtClean="0"/>
+              <a:t>that is stored on Bob’s trusted device is sent to the server.</a:t>
+            </a:r>
+            <a:endParaRPr lang="en-US" dirty="0" smtClean="0"/>
+          </a:p>
+          <a:p>
+            <a:endParaRPr lang="en-US" dirty="0" smtClean="0"/>
+          </a:p>
+          <a:p>
+            <a:r>
+              <a:rPr lang="en-US" dirty="0" smtClean="0"/>
+              <a:t>Bob’s address and payment information is </a:t>
+            </a:r>
+            <a:r>
+              <a:rPr lang="en-US" dirty="0" smtClean="0"/>
+              <a:t>decrypted, sent to the </a:t>
+            </a:r>
+            <a:r>
+              <a:rPr lang="en-US" dirty="0" smtClean="0"/>
+              <a:t>E-Commerce site, </a:t>
+            </a:r>
+            <a:r>
+              <a:rPr lang="en-US" dirty="0" smtClean="0"/>
+              <a:t>and then the key is forgotten</a:t>
+            </a:r>
           </a:p>
         </p:txBody>
       </p:sp>
@@ -4865,7 +5317,15 @@
           <a:p>
             <a:r>
               <a:rPr lang="en-US" dirty="0" smtClean="0"/>
-              <a:t>Implementation Details</a:t>
+              <a:t>Solution </a:t>
+            </a:r>
+            <a:r>
+              <a:rPr lang="mr-IN" dirty="0" smtClean="0"/>
+              <a:t>–</a:t>
+            </a:r>
+            <a:r>
+              <a:rPr lang="en-US" dirty="0" smtClean="0"/>
+              <a:t> Potential Adversaries</a:t>
             </a:r>
             <a:endParaRPr lang="en-US" dirty="0"/>
           </a:p>
@@ -4888,37 +5348,51 @@
           <a:p>
             <a:r>
               <a:rPr lang="en-US" dirty="0" smtClean="0"/>
-              <a:t>C++ Server </a:t>
-            </a:r>
-          </a:p>
-          <a:p>
-            <a:r>
-              <a:rPr lang="en-US" dirty="0" smtClean="0"/>
-              <a:t>Apache Thrift for communication (RPC)</a:t>
-            </a:r>
-          </a:p>
-          <a:p>
-            <a:r>
-              <a:rPr lang="en-US" dirty="0" smtClean="0"/>
-              <a:t>Java Demo App</a:t>
-            </a:r>
-          </a:p>
-          <a:p>
-            <a:r>
-              <a:rPr lang="en-US" dirty="0" smtClean="0"/>
-              <a:t>Java Portal App</a:t>
-            </a:r>
-          </a:p>
-          <a:p>
-            <a:r>
-              <a:rPr lang="en-US" dirty="0" smtClean="0"/>
-              <a:t>SSL everywhere</a:t>
+              <a:t>Obtaining a copy of the database</a:t>
+            </a:r>
+          </a:p>
+          <a:p>
+            <a:pPr lvl="1"/>
+            <a:r>
+              <a:rPr lang="en-US" dirty="0" smtClean="0"/>
+              <a:t>Secure! Each user’s info is stored encrypted with a unique key that is not stored on the server.</a:t>
+            </a:r>
+          </a:p>
+          <a:p>
+            <a:r>
+              <a:rPr lang="en-US" dirty="0" smtClean="0"/>
+              <a:t>Government/Authority request of data</a:t>
+            </a:r>
+          </a:p>
+          <a:p>
+            <a:pPr lvl="1"/>
+            <a:r>
+              <a:rPr lang="en-US" dirty="0" smtClean="0"/>
+              <a:t>Secure!</a:t>
+            </a:r>
+          </a:p>
+          <a:p>
+            <a:r>
+              <a:rPr lang="en-US" dirty="0" smtClean="0"/>
+              <a:t>MITM/Impersonation</a:t>
+            </a:r>
+          </a:p>
+          <a:p>
+            <a:pPr lvl="1"/>
+            <a:r>
+              <a:rPr lang="en-US" dirty="0" smtClean="0"/>
+              <a:t>Secure! (as long as SSL is configured properly.)</a:t>
             </a:r>
             <a:endParaRPr lang="en-US" dirty="0"/>
           </a:p>
         </p:txBody>
       </p:sp>
     </p:spTree>
+    <p:extLst>
+      <p:ext uri="{BB962C8B-B14F-4D97-AF65-F5344CB8AC3E}">
+        <p14:creationId xmlns:p14="http://schemas.microsoft.com/office/powerpoint/2010/main" val="895150811"/>
+      </p:ext>
+    </p:extLst>
   </p:cSld>
   <p:clrMapOvr>
     <a:masterClrMapping/>
@@ -4945,7 +5419,7 @@
       </p:grpSpPr>
       <p:sp>
         <p:nvSpPr>
-          <p:cNvPr id="2" name="Title 1"/>
+          <p:cNvPr id="5" name="Title 4"/>
           <p:cNvSpPr>
             <a:spLocks noGrp="1"/>
           </p:cNvSpPr>
@@ -4960,20 +5434,68 @@
           <a:p>
             <a:r>
               <a:rPr lang="en-US" dirty="0" smtClean="0"/>
-              <a:t>Conclusion - Benefits</a:t>
+              <a:t>Solution – Message Diagram</a:t>
             </a:r>
             <a:endParaRPr lang="en-US" dirty="0"/>
           </a:p>
         </p:txBody>
       </p:sp>
-      <p:sp>
-        <p:nvSpPr>
-          <p:cNvPr id="3" name="Content Placeholder 2"/>
-          <p:cNvSpPr>
-            <a:spLocks noGrp="1"/>
-          </p:cNvSpPr>
-          <p:nvPr>
-            <p:ph idx="1"/>
+      <p:pic>
+        <p:nvPicPr>
+          <p:cNvPr id="4" name="Content Placeholder 3" descr="message diagram.png"/>
+          <p:cNvPicPr>
+            <a:picLocks noGrp="1" noChangeAspect="1"/>
+          </p:cNvPicPr>
+          <p:nvPr>
+            <p:ph sz="half" idx="1"/>
+          </p:nvPr>
+        </p:nvPicPr>
+        <p:blipFill>
+          <a:blip r:embed="rId2" cstate="print"/>
+          <a:stretch>
+            <a:fillRect/>
+          </a:stretch>
+        </p:blipFill>
+        <p:spPr>
+          <a:xfrm>
+            <a:off x="685800" y="1600200"/>
+            <a:ext cx="7772400" cy="5116201"/>
+          </a:xfrm>
+        </p:spPr>
+      </p:pic>
+    </p:spTree>
+  </p:cSld>
+  <p:clrMapOvr>
+    <a:masterClrMapping/>
+  </p:clrMapOvr>
+</p:sld>
+</file>
+
+<file path=ppt/slides/slide9.xml><?xml version="1.0" encoding="utf-8"?>
+<p:sld xmlns:a="http://schemas.openxmlformats.org/drawingml/2006/main" xmlns:r="http://schemas.openxmlformats.org/officeDocument/2006/relationships" xmlns:p="http://schemas.openxmlformats.org/presentationml/2006/main">
+  <p:cSld>
+    <p:spTree>
+      <p:nvGrpSpPr>
+        <p:cNvPr id="1" name=""/>
+        <p:cNvGrpSpPr/>
+        <p:nvPr/>
+      </p:nvGrpSpPr>
+      <p:grpSpPr>
+        <a:xfrm>
+          <a:off x="0" y="0"/>
+          <a:ext cx="0" cy="0"/>
+          <a:chOff x="0" y="0"/>
+          <a:chExt cx="0" cy="0"/>
+        </a:xfrm>
+      </p:grpSpPr>
+      <p:sp>
+        <p:nvSpPr>
+          <p:cNvPr id="2" name="Title 1"/>
+          <p:cNvSpPr>
+            <a:spLocks noGrp="1"/>
+          </p:cNvSpPr>
+          <p:nvPr>
+            <p:ph type="title"/>
           </p:nvPr>
         </p:nvSpPr>
         <p:spPr/>
@@ -4983,24 +5505,94 @@
           <a:p>
             <a:r>
               <a:rPr lang="en-US" dirty="0" smtClean="0"/>
-              <a:t>The user never has to remember all of his information</a:t>
-            </a:r>
-          </a:p>
-          <a:p>
-            <a:r>
-              <a:rPr lang="en-US" dirty="0" smtClean="0"/>
-              <a:t>Even if the authentication server is compromised, all of the data is encrypted, and the key doesn’t exist on that system.</a:t>
-            </a:r>
-          </a:p>
-          <a:p>
-            <a:r>
-              <a:rPr lang="en-US" dirty="0" smtClean="0"/>
-              <a:t>The portal can generate and then forget the password itself.</a:t>
+              <a:t>Implementation Details</a:t>
             </a:r>
             <a:endParaRPr lang="en-US" dirty="0"/>
           </a:p>
         </p:txBody>
       </p:sp>
+      <p:sp>
+        <p:nvSpPr>
+          <p:cNvPr id="3" name="Content Placeholder 2"/>
+          <p:cNvSpPr>
+            <a:spLocks noGrp="1"/>
+          </p:cNvSpPr>
+          <p:nvPr>
+            <p:ph idx="1"/>
+          </p:nvPr>
+        </p:nvSpPr>
+        <p:spPr>
+          <a:xfrm>
+            <a:off x="457200" y="1775191"/>
+            <a:ext cx="5105400" cy="4625609"/>
+          </a:xfrm>
+        </p:spPr>
+        <p:txBody>
+          <a:bodyPr/>
+          <a:lstStyle/>
+          <a:p>
+            <a:r>
+              <a:rPr lang="en-US" dirty="0" smtClean="0"/>
+              <a:t>C++ Server </a:t>
+            </a:r>
+          </a:p>
+          <a:p>
+            <a:r>
+              <a:rPr lang="en-US" dirty="0" smtClean="0"/>
+              <a:t>Apache Thrift for communication (RPC)</a:t>
+            </a:r>
+          </a:p>
+          <a:p>
+            <a:r>
+              <a:rPr lang="en-US" dirty="0" smtClean="0"/>
+              <a:t>Java Demo App</a:t>
+            </a:r>
+          </a:p>
+          <a:p>
+            <a:r>
+              <a:rPr lang="en-US" dirty="0" smtClean="0"/>
+              <a:t>Java Portal App</a:t>
+            </a:r>
+          </a:p>
+          <a:p>
+            <a:r>
+              <a:rPr lang="en-US" dirty="0" smtClean="0"/>
+              <a:t>SSL everywhere</a:t>
+            </a:r>
+            <a:endParaRPr lang="en-US" dirty="0"/>
+          </a:p>
+        </p:txBody>
+      </p:sp>
+      <p:pic>
+        <p:nvPicPr>
+          <p:cNvPr id="4" name="Picture 3"/>
+          <p:cNvPicPr>
+            <a:picLocks noChangeAspect="1"/>
+          </p:cNvPicPr>
+          <p:nvPr/>
+        </p:nvPicPr>
+        <p:blipFill>
+          <a:blip r:embed="rId2">
+            <a:extLst>
+              <a:ext uri="{28A0092B-C50C-407E-A947-70E740481C1C}">
+                <a14:useLocalDpi xmlns:a14="http://schemas.microsoft.com/office/drawing/2010/main" val="0"/>
+              </a:ext>
+            </a:extLst>
+          </a:blip>
+          <a:stretch>
+            <a:fillRect/>
+          </a:stretch>
+        </p:blipFill>
+        <p:spPr>
+          <a:xfrm>
+            <a:off x="5930326" y="1676400"/>
+            <a:ext cx="2793008" cy="5048361"/>
+          </a:xfrm>
+          <a:prstGeom prst="rect">
+            <a:avLst/>
+          </a:prstGeom>
+        </p:spPr>
+      </p:pic>
     </p:spTree>
   </p:cSld>
   <p:clrMapOvr>

</xml_diff>